<commit_message>
Added info about building the remote control
</commit_message>
<xml_diff>
--- a/documents_presentations/advocating_technology_at_junior_high_Hebrew.pptx
+++ b/documents_presentations/advocating_technology_at_junior_high_Hebrew.pptx
@@ -137,7 +137,7 @@
               <a:rPr b="0" lang="en-US" sz="1400" spc="-1" strike="noStrike">
                 <a:latin typeface="Times New Roman"/>
               </a:rPr>
-              <a:t> </a:t>
+              <a:t>&lt;header&gt;</a:t>
             </a:r>
             <a:endParaRPr b="0" lang="en-US" sz="1400" spc="-1" strike="noStrike">
               <a:latin typeface="Times New Roman"/>
@@ -172,7 +172,7 @@
               <a:rPr b="0" lang="en-US" sz="1400" spc="-1" strike="noStrike">
                 <a:latin typeface="Times New Roman"/>
               </a:rPr>
-              <a:t> </a:t>
+              <a:t>&lt;date/time&gt;</a:t>
             </a:r>
             <a:endParaRPr b="0" lang="en-US" sz="1400" spc="-1" strike="noStrike">
               <a:latin typeface="Times New Roman"/>
@@ -206,7 +206,7 @@
               <a:rPr b="0" lang="en-US" sz="1400" spc="-1" strike="noStrike">
                 <a:latin typeface="Times New Roman"/>
               </a:rPr>
-              <a:t> </a:t>
+              <a:t>&lt;footer&gt;</a:t>
             </a:r>
             <a:endParaRPr b="0" lang="en-US" sz="1400" spc="-1" strike="noStrike">
               <a:latin typeface="Times New Roman"/>
@@ -237,7 +237,7 @@
           <a:bodyPr lIns="0" rIns="0" tIns="0" bIns="0" anchor="b"/>
           <a:p>
             <a:pPr algn="r"/>
-            <a:fld id="{7B1DAA91-3A44-42CF-867E-0A86BA57AC56}" type="slidenum">
+            <a:fld id="{9EBF3BEE-184C-4EA3-85E9-F64F705A6181}" type="slidenum">
               <a:rPr b="0" lang="en-US" sz="1400" spc="-1" strike="noStrike">
                 <a:latin typeface="Times New Roman"/>
               </a:rPr>
@@ -285,7 +285,7 @@
         <p:spPr>
           <a:xfrm>
             <a:off x="1372320" y="800640"/>
-            <a:ext cx="5027760" cy="3770640"/>
+            <a:ext cx="5027400" cy="3770280"/>
           </a:xfrm>
           <a:prstGeom prst="rect">
             <a:avLst/>
@@ -305,7 +305,7 @@
         <p:spPr>
           <a:xfrm>
             <a:off x="777240" y="4777560"/>
-            <a:ext cx="6216840" cy="4435200"/>
+            <a:ext cx="6216480" cy="4434840"/>
           </a:xfrm>
           <a:prstGeom prst="rect">
             <a:avLst/>
@@ -314,7 +314,7 @@
         <p:txBody>
           <a:bodyPr lIns="0" rIns="0" tIns="0" bIns="0"/>
           <a:p>
-            <a:pPr marL="216000" indent="-215640">
+            <a:pPr marL="216000" indent="-215280">
               <a:lnSpc>
                 <a:spcPct val="100000"/>
               </a:lnSpc>
@@ -330,7 +330,7 @@
             </a:endParaRPr>
           </a:p>
           <a:p>
-            <a:pPr marL="216000" indent="-215640">
+            <a:pPr marL="216000" indent="-215280">
               <a:lnSpc>
                 <a:spcPct val="100000"/>
               </a:lnSpc>
@@ -352,7 +352,7 @@
             </a:endParaRPr>
           </a:p>
           <a:p>
-            <a:pPr marL="216000" indent="-215640">
+            <a:pPr marL="216000" indent="-215280">
               <a:lnSpc>
                 <a:spcPct val="100000"/>
               </a:lnSpc>
@@ -374,7 +374,7 @@
             </a:endParaRPr>
           </a:p>
           <a:p>
-            <a:pPr marL="216000" indent="-215640">
+            <a:pPr marL="216000" indent="-215280">
               <a:lnSpc>
                 <a:spcPct val="100000"/>
               </a:lnSpc>
@@ -396,7 +396,7 @@
             </a:endParaRPr>
           </a:p>
           <a:p>
-            <a:pPr marL="216000" indent="-215640">
+            <a:pPr marL="216000" indent="-215280">
               <a:lnSpc>
                 <a:spcPct val="100000"/>
               </a:lnSpc>
@@ -418,7 +418,7 @@
             </a:endParaRPr>
           </a:p>
           <a:p>
-            <a:pPr marL="216000" indent="-215640">
+            <a:pPr marL="216000" indent="-215280">
               <a:lnSpc>
                 <a:spcPct val="100000"/>
               </a:lnSpc>
@@ -440,7 +440,7 @@
             </a:endParaRPr>
           </a:p>
           <a:p>
-            <a:pPr marL="216000" indent="-215640">
+            <a:pPr marL="216000" indent="-215280">
               <a:lnSpc>
                 <a:spcPct val="100000"/>
               </a:lnSpc>
@@ -462,7 +462,7 @@
             </a:endParaRPr>
           </a:p>
           <a:p>
-            <a:pPr marL="216000" indent="-215640">
+            <a:pPr marL="216000" indent="-215280">
               <a:lnSpc>
                 <a:spcPct val="100000"/>
               </a:lnSpc>
@@ -484,7 +484,7 @@
             </a:endParaRPr>
           </a:p>
           <a:p>
-            <a:pPr marL="216000" indent="-215640">
+            <a:pPr marL="216000" indent="-215280">
               <a:lnSpc>
                 <a:spcPct val="100000"/>
               </a:lnSpc>
@@ -3215,8 +3215,8 @@
         </p:nvSpPr>
         <p:spPr>
           <a:xfrm>
-            <a:off x="504000" y="805320"/>
-            <a:ext cx="9070920" cy="1261440"/>
+            <a:off x="504000" y="301320"/>
+            <a:ext cx="9072000" cy="1261800"/>
           </a:xfrm>
           <a:prstGeom prst="rect">
             <a:avLst/>
@@ -3225,13 +3225,14 @@
         <p:txBody>
           <a:bodyPr lIns="0" rIns="0" tIns="0" bIns="0" anchor="ctr"/>
           <a:p>
-            <a:r>
-              <a:rPr b="0" lang="en-US" sz="1800" spc="-1" strike="noStrike">
+            <a:pPr algn="ctr"/>
+            <a:r>
+              <a:rPr b="0" lang="en-US" sz="4400" spc="-1" strike="noStrike">
                 <a:latin typeface="Arial"/>
               </a:rPr>
               <a:t>Click to edit the title text format</a:t>
             </a:r>
-            <a:endParaRPr b="0" lang="en-US" sz="1800" spc="-1" strike="noStrike">
+            <a:endParaRPr b="0" lang="en-US" sz="4400" spc="-1" strike="noStrike">
               <a:latin typeface="Arial"/>
             </a:endParaRPr>
           </a:p>
@@ -3249,8 +3250,8 @@
         </p:nvSpPr>
         <p:spPr>
           <a:xfrm>
-            <a:off x="504000" y="2273040"/>
-            <a:ext cx="9070920" cy="3716640"/>
+            <a:off x="504000" y="1768680"/>
+            <a:ext cx="9072000" cy="4384080"/>
           </a:xfrm>
           <a:prstGeom prst="rect">
             <a:avLst/>
@@ -3273,12 +3274,12 @@
               <a:buChar char=""/>
             </a:pPr>
             <a:r>
-              <a:rPr b="0" lang="en-US" sz="1800" spc="-1" strike="noStrike">
+              <a:rPr b="0" lang="en-US" sz="3200" spc="-1" strike="noStrike">
                 <a:latin typeface="Arial"/>
               </a:rPr>
               <a:t>Click to edit the outline text format</a:t>
             </a:r>
-            <a:endParaRPr b="0" lang="en-US" sz="1800" spc="-1" strike="noStrike">
+            <a:endParaRPr b="0" lang="en-US" sz="3200" spc="-1" strike="noStrike">
               <a:latin typeface="Arial"/>
             </a:endParaRPr>
           </a:p>
@@ -3295,12 +3296,12 @@
               <a:buChar char=""/>
             </a:pPr>
             <a:r>
-              <a:rPr b="0" lang="en-US" sz="1800" spc="-1" strike="noStrike">
+              <a:rPr b="0" lang="en-US" sz="2800" spc="-1" strike="noStrike">
                 <a:latin typeface="Arial"/>
               </a:rPr>
               <a:t>Second Outline Level</a:t>
             </a:r>
-            <a:endParaRPr b="0" lang="en-US" sz="1800" spc="-1" strike="noStrike">
+            <a:endParaRPr b="0" lang="en-US" sz="2800" spc="-1" strike="noStrike">
               <a:latin typeface="Arial"/>
             </a:endParaRPr>
           </a:p>
@@ -3317,12 +3318,12 @@
               <a:buChar char=""/>
             </a:pPr>
             <a:r>
-              <a:rPr b="0" lang="en-US" sz="1800" spc="-1" strike="noStrike">
+              <a:rPr b="0" lang="en-US" sz="2400" spc="-1" strike="noStrike">
                 <a:latin typeface="Arial"/>
               </a:rPr>
               <a:t>Third Outline Level</a:t>
             </a:r>
-            <a:endParaRPr b="0" lang="en-US" sz="1800" spc="-1" strike="noStrike">
+            <a:endParaRPr b="0" lang="en-US" sz="2400" spc="-1" strike="noStrike">
               <a:latin typeface="Arial"/>
             </a:endParaRPr>
           </a:p>
@@ -3339,12 +3340,12 @@
               <a:buChar char=""/>
             </a:pPr>
             <a:r>
-              <a:rPr b="0" lang="en-US" sz="1800" spc="-1" strike="noStrike">
+              <a:rPr b="0" lang="en-US" sz="2000" spc="-1" strike="noStrike">
                 <a:latin typeface="Arial"/>
               </a:rPr>
               <a:t>Fourth Outline Level</a:t>
             </a:r>
-            <a:endParaRPr b="0" lang="en-US" sz="1800" spc="-1" strike="noStrike">
+            <a:endParaRPr b="0" lang="en-US" sz="2000" spc="-1" strike="noStrike">
               <a:latin typeface="Arial"/>
             </a:endParaRPr>
           </a:p>
@@ -3361,12 +3362,12 @@
               <a:buChar char=""/>
             </a:pPr>
             <a:r>
-              <a:rPr b="0" lang="en-US" sz="1800" spc="-1" strike="noStrike">
+              <a:rPr b="0" lang="en-US" sz="2000" spc="-1" strike="noStrike">
                 <a:latin typeface="Arial"/>
               </a:rPr>
               <a:t>Fifth Outline Level</a:t>
             </a:r>
-            <a:endParaRPr b="0" lang="en-US" sz="1800" spc="-1" strike="noStrike">
+            <a:endParaRPr b="0" lang="en-US" sz="2000" spc="-1" strike="noStrike">
               <a:latin typeface="Arial"/>
             </a:endParaRPr>
           </a:p>
@@ -3383,12 +3384,12 @@
               <a:buChar char=""/>
             </a:pPr>
             <a:r>
-              <a:rPr b="0" lang="en-US" sz="1800" spc="-1" strike="noStrike">
+              <a:rPr b="0" lang="en-US" sz="2000" spc="-1" strike="noStrike">
                 <a:latin typeface="Arial"/>
               </a:rPr>
               <a:t>Sixth Outline Level</a:t>
             </a:r>
-            <a:endParaRPr b="0" lang="en-US" sz="1800" spc="-1" strike="noStrike">
+            <a:endParaRPr b="0" lang="en-US" sz="2000" spc="-1" strike="noStrike">
               <a:latin typeface="Arial"/>
             </a:endParaRPr>
           </a:p>
@@ -3405,12 +3406,12 @@
               <a:buChar char=""/>
             </a:pPr>
             <a:r>
-              <a:rPr b="0" lang="en-US" sz="1800" spc="-1" strike="noStrike">
+              <a:rPr b="0" lang="en-US" sz="2000" spc="-1" strike="noStrike">
                 <a:latin typeface="Arial"/>
               </a:rPr>
               <a:t>Seventh Outline Level</a:t>
             </a:r>
-            <a:endParaRPr b="0" lang="en-US" sz="1800" spc="-1" strike="noStrike">
+            <a:endParaRPr b="0" lang="en-US" sz="2000" spc="-1" strike="noStrike">
               <a:latin typeface="Arial"/>
             </a:endParaRPr>
           </a:p>
@@ -3723,7 +3724,7 @@
         <p:spPr>
           <a:xfrm>
             <a:off x="1591200" y="2934000"/>
-            <a:ext cx="7012080" cy="938880"/>
+            <a:ext cx="7011720" cy="938520"/>
           </a:xfrm>
           <a:prstGeom prst="rect">
             <a:avLst/>
@@ -3772,7 +3773,7 @@
         <p:spPr>
           <a:xfrm>
             <a:off x="2286000" y="3934800"/>
-            <a:ext cx="5714280" cy="813600"/>
+            <a:ext cx="5713920" cy="813240"/>
           </a:xfrm>
           <a:prstGeom prst="rect">
             <a:avLst/>
@@ -3880,7 +3881,7 @@
         <p:spPr>
           <a:xfrm>
             <a:off x="504000" y="850320"/>
-            <a:ext cx="9070920" cy="1171440"/>
+            <a:ext cx="9070560" cy="1171080"/>
           </a:xfrm>
           <a:prstGeom prst="rect">
             <a:avLst/>
@@ -3912,7 +3913,7 @@
                 <a:latin typeface="Arial"/>
                 <a:ea typeface="DejaVu Sans"/>
               </a:rPr>
-              <a:t>התנסות</a:t>
+              <a:t>סוף והתחלה</a:t>
             </a:r>
             <a:endParaRPr b="0" lang="en-US" sz="6600" spc="-1" strike="noStrike">
               <a:latin typeface="Arial"/>
@@ -3929,7 +3930,7 @@
         <p:spPr>
           <a:xfrm>
             <a:off x="504000" y="2273040"/>
-            <a:ext cx="9070920" cy="3716640"/>
+            <a:ext cx="9070560" cy="3716280"/>
           </a:xfrm>
           <a:prstGeom prst="rect">
             <a:avLst/>
@@ -3948,7 +3949,7 @@
         <p:txBody>
           <a:bodyPr lIns="0" rIns="0" tIns="0" bIns="0"/>
           <a:p>
-            <a:pPr marL="432000" indent="-323280" algn="r" rtl="1">
+            <a:pPr marL="432000" indent="-322920" algn="r" rtl="1">
               <a:lnSpc>
                 <a:spcPct val="100000"/>
               </a:lnSpc>
@@ -3970,7 +3971,65 @@
                 <a:latin typeface="Arial"/>
                 <a:ea typeface="DejaVu Sans"/>
               </a:rPr>
-              <a:t>לימוד הקס ?</a:t>
+              <a:t>התלמידים מסתכלים על הדפסות התוכנה של הרובוט</a:t>
+            </a:r>
+            <a:endParaRPr b="0" lang="en-US" sz="2200" spc="-1" strike="noStrike">
+              <a:latin typeface="Arial"/>
+            </a:endParaRPr>
+          </a:p>
+          <a:p>
+            <a:pPr marL="432000" indent="-322920" algn="r" rtl="1">
+              <a:lnSpc>
+                <a:spcPct val="100000"/>
+              </a:lnSpc>
+              <a:spcAft>
+                <a:spcPts val="1417"/>
+              </a:spcAft>
+              <a:buClr>
+                <a:srgbClr val="ffffff"/>
+              </a:buClr>
+              <a:buSzPct val="45000"/>
+              <a:buFont typeface="Wingdings" charset="2"/>
+              <a:buChar char=""/>
+            </a:pPr>
+            <a:r>
+              <a:rPr b="0" lang="en-US" sz="2200" spc="-1" strike="noStrike">
+                <a:solidFill>
+                  <a:srgbClr val="ffffff"/>
+                </a:solidFill>
+                <a:latin typeface="Arial"/>
+                <a:ea typeface="DejaVu Sans"/>
+              </a:rPr>
+              <a:t>תלמיד א: איך מתי מתאים שאשתלט על המחשב שלך ונפעיל את המצלמה ? לשנות את זה ?</a:t>
+            </a:r>
+            <a:endParaRPr b="0" lang="en-US" sz="2200" spc="-1" strike="noStrike">
+              <a:latin typeface="Arial"/>
+            </a:endParaRPr>
+          </a:p>
+          <a:p>
+            <a:pPr marL="432000" indent="-322920" algn="r" rtl="1">
+              <a:lnSpc>
+                <a:spcPct val="100000"/>
+              </a:lnSpc>
+              <a:spcAft>
+                <a:spcPts val="1417"/>
+              </a:spcAft>
+              <a:buClr>
+                <a:srgbClr val="ffffff"/>
+              </a:buClr>
+              <a:buSzPct val="45000"/>
+              <a:buFont typeface="Wingdings" charset="2"/>
+              <a:buChar char=""/>
+            </a:pPr>
+            <a:r>
+              <a:rPr b="0" lang="en-US" sz="2200" spc="-1" strike="noStrike">
+                <a:solidFill>
+                  <a:srgbClr val="ffffff"/>
+                </a:solidFill>
+                <a:latin typeface="Arial"/>
+                <a:ea typeface="DejaVu Sans"/>
+              </a:rPr>
+              <a:t>תלמיד ב: אני לא יודע. בא נסתכל על הקוד.</a:t>
             </a:r>
             <a:endParaRPr b="0" lang="en-US" sz="2200" spc="-1" strike="noStrike">
               <a:latin typeface="Arial"/>
@@ -4036,7 +4095,7 @@
         <p:spPr>
           <a:xfrm>
             <a:off x="504000" y="850320"/>
-            <a:ext cx="9070920" cy="1171440"/>
+            <a:ext cx="9070560" cy="1171080"/>
           </a:xfrm>
           <a:prstGeom prst="rect">
             <a:avLst/>
@@ -4085,7 +4144,7 @@
         <p:spPr>
           <a:xfrm>
             <a:off x="504000" y="2273040"/>
-            <a:ext cx="9070920" cy="4804200"/>
+            <a:ext cx="9070560" cy="4803840"/>
           </a:xfrm>
           <a:prstGeom prst="rect">
             <a:avLst/>
@@ -4104,7 +4163,7 @@
         <p:txBody>
           <a:bodyPr lIns="0" rIns="0" tIns="0" bIns="0"/>
           <a:p>
-            <a:pPr marL="432000" indent="-323280" algn="r" rtl="1">
+            <a:pPr marL="432000" indent="-322920" algn="r" rtl="1">
               <a:lnSpc>
                 <a:spcPct val="100000"/>
               </a:lnSpc>
@@ -4133,7 +4192,7 @@
             </a:endParaRPr>
           </a:p>
           <a:p>
-            <a:pPr marL="432000" indent="-323280" algn="r" rtl="1">
+            <a:pPr marL="432000" indent="-322920" algn="r" rtl="1">
               <a:lnSpc>
                 <a:spcPct val="100000"/>
               </a:lnSpc>
@@ -4162,7 +4221,7 @@
             </a:endParaRPr>
           </a:p>
           <a:p>
-            <a:pPr marL="432000" indent="-323280" algn="r" rtl="1">
+            <a:pPr marL="432000" indent="-322920" algn="r" rtl="1">
               <a:lnSpc>
                 <a:spcPct val="100000"/>
               </a:lnSpc>
@@ -4191,7 +4250,7 @@
             </a:endParaRPr>
           </a:p>
           <a:p>
-            <a:pPr marL="432000" indent="-323280" algn="r" rtl="1">
+            <a:pPr marL="432000" indent="-322920" algn="r" rtl="1">
               <a:lnSpc>
                 <a:spcPct val="100000"/>
               </a:lnSpc>
@@ -4220,7 +4279,7 @@
             </a:endParaRPr>
           </a:p>
           <a:p>
-            <a:pPr marL="432000" indent="-323280" algn="r" rtl="1">
+            <a:pPr marL="432000" indent="-322920" algn="r" rtl="1">
               <a:lnSpc>
                 <a:spcPct val="100000"/>
               </a:lnSpc>
@@ -4249,7 +4308,7 @@
             </a:endParaRPr>
           </a:p>
           <a:p>
-            <a:pPr marL="432000" indent="-323280" algn="r" rtl="1">
+            <a:pPr marL="432000" indent="-322920" algn="r" rtl="1">
               <a:lnSpc>
                 <a:spcPct val="100000"/>
               </a:lnSpc>
@@ -4278,7 +4337,7 @@
             </a:endParaRPr>
           </a:p>
           <a:p>
-            <a:pPr marL="432000" indent="-323280" algn="r" rtl="1">
+            <a:pPr marL="432000" indent="-322920" algn="r" rtl="1">
               <a:lnSpc>
                 <a:spcPct val="100000"/>
               </a:lnSpc>
@@ -4366,7 +4425,7 @@
         <p:spPr>
           <a:xfrm>
             <a:off x="504000" y="850320"/>
-            <a:ext cx="9070920" cy="1171440"/>
+            <a:ext cx="9070560" cy="1171080"/>
           </a:xfrm>
           <a:prstGeom prst="rect">
             <a:avLst/>
@@ -4415,7 +4474,7 @@
         <p:spPr>
           <a:xfrm>
             <a:off x="504000" y="2273040"/>
-            <a:ext cx="9070920" cy="3716640"/>
+            <a:ext cx="9070560" cy="3716280"/>
           </a:xfrm>
           <a:prstGeom prst="rect">
             <a:avLst/>
@@ -4434,7 +4493,7 @@
         <p:txBody>
           <a:bodyPr lIns="0" rIns="0" tIns="0" bIns="0"/>
           <a:p>
-            <a:pPr marL="432000" indent="-323280" algn="r" rtl="1">
+            <a:pPr marL="432000" indent="-322920" algn="r" rtl="1">
               <a:lnSpc>
                 <a:spcPct val="100000"/>
               </a:lnSpc>
@@ -4463,7 +4522,7 @@
             </a:endParaRPr>
           </a:p>
           <a:p>
-            <a:pPr marL="432000" indent="-323280" algn="r" rtl="1">
+            <a:pPr marL="432000" indent="-322920" algn="r" rtl="1">
               <a:lnSpc>
                 <a:spcPct val="100000"/>
               </a:lnSpc>
@@ -4551,7 +4610,7 @@
         <p:spPr>
           <a:xfrm>
             <a:off x="504000" y="850320"/>
-            <a:ext cx="9070920" cy="1171440"/>
+            <a:ext cx="9070560" cy="1171080"/>
           </a:xfrm>
           <a:prstGeom prst="rect">
             <a:avLst/>
@@ -4600,7 +4659,7 @@
         <p:spPr>
           <a:xfrm>
             <a:off x="504000" y="2273040"/>
-            <a:ext cx="9070920" cy="3851640"/>
+            <a:ext cx="9070560" cy="3851280"/>
           </a:xfrm>
           <a:prstGeom prst="rect">
             <a:avLst/>
@@ -4632,7 +4691,7 @@
             </a:endParaRPr>
           </a:p>
           <a:p>
-            <a:pPr marL="432000" indent="-323280" algn="r" rtl="1">
+            <a:pPr marL="432000" indent="-322920" algn="r" rtl="1">
               <a:lnSpc>
                 <a:spcPct val="100000"/>
               </a:lnSpc>
@@ -4661,7 +4720,7 @@
             </a:endParaRPr>
           </a:p>
           <a:p>
-            <a:pPr marL="432000" indent="-323280" rtl="1">
+            <a:pPr marL="432000" indent="-322920" rtl="1">
               <a:lnSpc>
                 <a:spcPct val="100000"/>
               </a:lnSpc>
@@ -4701,7 +4760,7 @@
             </a:endParaRPr>
           </a:p>
           <a:p>
-            <a:pPr marL="432000" indent="-323280" algn="r" rtl="1">
+            <a:pPr marL="432000" indent="-322920" algn="r" rtl="1">
               <a:lnSpc>
                 <a:spcPct val="100000"/>
               </a:lnSpc>
@@ -4750,7 +4809,7 @@
             </a:endParaRPr>
           </a:p>
           <a:p>
-            <a:pPr marL="432000" indent="-323280" algn="r" rtl="1">
+            <a:pPr marL="432000" indent="-322920" algn="r" rtl="1">
               <a:lnSpc>
                 <a:spcPct val="100000"/>
               </a:lnSpc>
@@ -4838,7 +4897,7 @@
         <p:spPr>
           <a:xfrm>
             <a:off x="504000" y="850320"/>
-            <a:ext cx="9070920" cy="1171440"/>
+            <a:ext cx="9070560" cy="1171080"/>
           </a:xfrm>
           <a:prstGeom prst="rect">
             <a:avLst/>
@@ -4887,7 +4946,7 @@
         <p:spPr>
           <a:xfrm>
             <a:off x="504000" y="2273040"/>
-            <a:ext cx="9070920" cy="4624200"/>
+            <a:ext cx="9070560" cy="4623840"/>
           </a:xfrm>
           <a:prstGeom prst="rect">
             <a:avLst/>
@@ -4906,7 +4965,7 @@
         <p:txBody>
           <a:bodyPr lIns="0" rIns="0" tIns="0" bIns="0"/>
           <a:p>
-            <a:pPr marL="432000" indent="-323280" algn="r" rtl="1">
+            <a:pPr marL="432000" indent="-322920" algn="r" rtl="1">
               <a:lnSpc>
                 <a:spcPct val="100000"/>
               </a:lnSpc>
@@ -4935,7 +4994,7 @@
             </a:endParaRPr>
           </a:p>
           <a:p>
-            <a:pPr marL="432000" indent="-323280" algn="r" rtl="1">
+            <a:pPr marL="432000" indent="-322920" algn="r" rtl="1">
               <a:lnSpc>
                 <a:spcPct val="100000"/>
               </a:lnSpc>
@@ -4964,7 +5023,7 @@
             </a:endParaRPr>
           </a:p>
           <a:p>
-            <a:pPr lvl="1" marL="432000" indent="-216000" algn="r" rtl="1">
+            <a:pPr lvl="1" marL="432000" indent="-215640" algn="r" rtl="1">
               <a:lnSpc>
                 <a:spcPct val="100000"/>
               </a:lnSpc>
@@ -4993,7 +5052,7 @@
             </a:endParaRPr>
           </a:p>
           <a:p>
-            <a:pPr marL="432000" indent="-323280" algn="r" rtl="1">
+            <a:pPr marL="432000" indent="-322920" algn="r" rtl="1">
               <a:lnSpc>
                 <a:spcPct val="100000"/>
               </a:lnSpc>
@@ -5022,7 +5081,7 @@
             </a:endParaRPr>
           </a:p>
           <a:p>
-            <a:pPr marL="432000" indent="-323280" algn="r" rtl="1">
+            <a:pPr marL="432000" indent="-322920" algn="r" rtl="1">
               <a:lnSpc>
                 <a:spcPct val="100000"/>
               </a:lnSpc>
@@ -5082,7 +5141,7 @@
             </a:endParaRPr>
           </a:p>
           <a:p>
-            <a:pPr marL="432000" indent="-323280" algn="r" rtl="1">
+            <a:pPr marL="432000" indent="-322920" algn="r" rtl="1">
               <a:lnSpc>
                 <a:spcPct val="100000"/>
               </a:lnSpc>
@@ -5180,7 +5239,7 @@
         <p:spPr>
           <a:xfrm>
             <a:off x="504000" y="850320"/>
-            <a:ext cx="9070920" cy="1171440"/>
+            <a:ext cx="9070560" cy="1171080"/>
           </a:xfrm>
           <a:prstGeom prst="rect">
             <a:avLst/>
@@ -5229,7 +5288,7 @@
         <p:spPr>
           <a:xfrm>
             <a:off x="504000" y="2273040"/>
-            <a:ext cx="9070920" cy="4784040"/>
+            <a:ext cx="9070560" cy="4783680"/>
           </a:xfrm>
           <a:prstGeom prst="rect">
             <a:avLst/>
@@ -5248,7 +5307,7 @@
         <p:txBody>
           <a:bodyPr lIns="0" rIns="0" tIns="0" bIns="0"/>
           <a:p>
-            <a:pPr marL="432000" indent="-323280" algn="r" rtl="1">
+            <a:pPr marL="432000" indent="-322920" algn="r" rtl="1">
               <a:lnSpc>
                 <a:spcPct val="100000"/>
               </a:lnSpc>
@@ -5277,7 +5336,7 @@
             </a:endParaRPr>
           </a:p>
           <a:p>
-            <a:pPr marL="432000" indent="-323280" algn="r" rtl="1">
+            <a:pPr marL="432000" indent="-322920" algn="r" rtl="1">
               <a:lnSpc>
                 <a:spcPct val="100000"/>
               </a:lnSpc>
@@ -5306,7 +5365,7 @@
             </a:endParaRPr>
           </a:p>
           <a:p>
-            <a:pPr marL="432000" indent="-323280" algn="r" rtl="1">
+            <a:pPr marL="432000" indent="-322920" algn="r" rtl="1">
               <a:lnSpc>
                 <a:spcPct val="100000"/>
               </a:lnSpc>
@@ -5335,7 +5394,7 @@
             </a:endParaRPr>
           </a:p>
           <a:p>
-            <a:pPr marL="432000" indent="-323280" algn="r" rtl="1">
+            <a:pPr marL="432000" indent="-322920" algn="r" rtl="1">
               <a:lnSpc>
                 <a:spcPct val="100000"/>
               </a:lnSpc>
@@ -5364,7 +5423,7 @@
             </a:endParaRPr>
           </a:p>
           <a:p>
-            <a:pPr marL="432000" indent="-323280" algn="r" rtl="1">
+            <a:pPr marL="432000" indent="-322920" algn="r" rtl="1">
               <a:lnSpc>
                 <a:spcPct val="100000"/>
               </a:lnSpc>
@@ -5393,7 +5452,7 @@
             </a:endParaRPr>
           </a:p>
           <a:p>
-            <a:pPr marL="432000" indent="-323280" algn="r" rtl="1">
+            <a:pPr marL="432000" indent="-322920" algn="r" rtl="1">
               <a:lnSpc>
                 <a:spcPct val="100000"/>
               </a:lnSpc>
@@ -5432,7 +5491,7 @@
             </a:endParaRPr>
           </a:p>
           <a:p>
-            <a:pPr marL="432000" indent="-323280" algn="r" rtl="1">
+            <a:pPr marL="432000" indent="-322920" algn="r" rtl="1">
               <a:lnSpc>
                 <a:spcPct val="100000"/>
               </a:lnSpc>
@@ -5520,7 +5579,7 @@
         <p:spPr>
           <a:xfrm>
             <a:off x="504000" y="850320"/>
-            <a:ext cx="9070920" cy="1171440"/>
+            <a:ext cx="9070560" cy="1171080"/>
           </a:xfrm>
           <a:prstGeom prst="rect">
             <a:avLst/>
@@ -5569,7 +5628,7 @@
         <p:spPr>
           <a:xfrm>
             <a:off x="529560" y="2286000"/>
-            <a:ext cx="9070920" cy="4799880"/>
+            <a:ext cx="9070560" cy="4799520"/>
           </a:xfrm>
           <a:prstGeom prst="rect">
             <a:avLst/>
@@ -5588,7 +5647,7 @@
         <p:txBody>
           <a:bodyPr lIns="0" rIns="0" tIns="0" bIns="0"/>
           <a:p>
-            <a:pPr marL="432000" indent="-323280" algn="r" rtl="1">
+            <a:pPr marL="432000" indent="-322920" algn="r" rtl="1">
               <a:lnSpc>
                 <a:spcPct val="100000"/>
               </a:lnSpc>
@@ -5617,7 +5676,7 @@
             </a:endParaRPr>
           </a:p>
           <a:p>
-            <a:pPr lvl="1" marL="864000" indent="-323280" algn="r" rtl="1">
+            <a:pPr lvl="1" marL="864000" indent="-322920" algn="r" rtl="1">
               <a:lnSpc>
                 <a:spcPct val="100000"/>
               </a:lnSpc>
@@ -5656,7 +5715,7 @@
             </a:endParaRPr>
           </a:p>
           <a:p>
-            <a:pPr lvl="1" marL="864000" indent="-323280" algn="r" rtl="1">
+            <a:pPr lvl="1" marL="864000" indent="-322920" algn="r" rtl="1">
               <a:lnSpc>
                 <a:spcPct val="100000"/>
               </a:lnSpc>
@@ -5705,7 +5764,7 @@
             </a:endParaRPr>
           </a:p>
           <a:p>
-            <a:pPr marL="432000" indent="-323280" algn="r" rtl="1">
+            <a:pPr marL="432000" indent="-322920" algn="r" rtl="1">
               <a:lnSpc>
                 <a:spcPct val="100000"/>
               </a:lnSpc>
@@ -5734,7 +5793,7 @@
             </a:endParaRPr>
           </a:p>
           <a:p>
-            <a:pPr marL="432000" indent="-323280" algn="r" rtl="1">
+            <a:pPr marL="432000" indent="-322920" algn="r" rtl="1">
               <a:lnSpc>
                 <a:spcPct val="100000"/>
               </a:lnSpc>
@@ -5763,7 +5822,7 @@
             </a:endParaRPr>
           </a:p>
           <a:p>
-            <a:pPr marL="432000" indent="-323280" algn="r" rtl="1">
+            <a:pPr marL="432000" indent="-322920" algn="r" rtl="1">
               <a:lnSpc>
                 <a:spcPct val="100000"/>
               </a:lnSpc>
@@ -5792,7 +5851,7 @@
             </a:endParaRPr>
           </a:p>
           <a:p>
-            <a:pPr marL="432000" indent="-323280" algn="r" rtl="1">
+            <a:pPr marL="432000" indent="-322920" algn="r" rtl="1">
               <a:lnSpc>
                 <a:spcPct val="100000"/>
               </a:lnSpc>
@@ -5880,7 +5939,7 @@
         <p:spPr>
           <a:xfrm>
             <a:off x="504000" y="850320"/>
-            <a:ext cx="9070920" cy="1171440"/>
+            <a:ext cx="9070560" cy="1171080"/>
           </a:xfrm>
           <a:prstGeom prst="rect">
             <a:avLst/>
@@ -5929,7 +5988,7 @@
         <p:spPr>
           <a:xfrm>
             <a:off x="504000" y="2273040"/>
-            <a:ext cx="9070920" cy="4804200"/>
+            <a:ext cx="9070560" cy="4803840"/>
           </a:xfrm>
           <a:prstGeom prst="rect">
             <a:avLst/>
@@ -5948,7 +6007,7 @@
         <p:txBody>
           <a:bodyPr lIns="0" rIns="0" tIns="0" bIns="0"/>
           <a:p>
-            <a:pPr marL="432000" indent="-323280" algn="r" rtl="1">
+            <a:pPr marL="432000" indent="-322920" algn="r" rtl="1">
               <a:lnSpc>
                 <a:spcPct val="100000"/>
               </a:lnSpc>
@@ -5977,7 +6036,7 @@
             </a:endParaRPr>
           </a:p>
           <a:p>
-            <a:pPr marL="432000" indent="-323280" algn="r" rtl="1">
+            <a:pPr marL="432000" indent="-322920" algn="r" rtl="1">
               <a:lnSpc>
                 <a:spcPct val="100000"/>
               </a:lnSpc>
@@ -6006,7 +6065,7 @@
             </a:endParaRPr>
           </a:p>
           <a:p>
-            <a:pPr marL="432000" indent="-323280" algn="r" rtl="1">
+            <a:pPr marL="432000" indent="-322920" algn="r" rtl="1">
               <a:lnSpc>
                 <a:spcPct val="100000"/>
               </a:lnSpc>
@@ -6035,7 +6094,7 @@
             </a:endParaRPr>
           </a:p>
           <a:p>
-            <a:pPr marL="432000" indent="-323280" algn="r" rtl="1">
+            <a:pPr marL="432000" indent="-322920" algn="r" rtl="1">
               <a:lnSpc>
                 <a:spcPct val="100000"/>
               </a:lnSpc>
@@ -6064,7 +6123,7 @@
             </a:endParaRPr>
           </a:p>
           <a:p>
-            <a:pPr marL="432000" indent="-323280" algn="r" rtl="1">
+            <a:pPr marL="432000" indent="-322920" algn="r" rtl="1">
               <a:lnSpc>
                 <a:spcPct val="100000"/>
               </a:lnSpc>
@@ -6113,7 +6172,7 @@
             </a:endParaRPr>
           </a:p>
           <a:p>
-            <a:pPr marL="432000" indent="-323280" algn="r" rtl="1">
+            <a:pPr marL="432000" indent="-322920" algn="r" rtl="1">
               <a:lnSpc>
                 <a:spcPct val="100000"/>
               </a:lnSpc>
@@ -6142,7 +6201,7 @@
             </a:endParaRPr>
           </a:p>
           <a:p>
-            <a:pPr marL="432000" indent="-323280" algn="r" rtl="1">
+            <a:pPr marL="432000" indent="-322920" algn="r" rtl="1">
               <a:lnSpc>
                 <a:spcPct val="100000"/>
               </a:lnSpc>
@@ -6230,7 +6289,7 @@
         <p:spPr>
           <a:xfrm>
             <a:off x="504000" y="850320"/>
-            <a:ext cx="9070920" cy="1171440"/>
+            <a:ext cx="9070560" cy="1171080"/>
           </a:xfrm>
           <a:prstGeom prst="rect">
             <a:avLst/>
@@ -6279,7 +6338,7 @@
         <p:spPr>
           <a:xfrm>
             <a:off x="504000" y="2273040"/>
-            <a:ext cx="9070920" cy="3716640"/>
+            <a:ext cx="9070560" cy="3716280"/>
           </a:xfrm>
           <a:prstGeom prst="rect">
             <a:avLst/>
@@ -6298,7 +6357,7 @@
         <p:txBody>
           <a:bodyPr lIns="0" rIns="0" tIns="0" bIns="0"/>
           <a:p>
-            <a:pPr marL="432000" indent="-323280" algn="r" rtl="1">
+            <a:pPr marL="432000" indent="-322920" algn="r" rtl="1">
               <a:lnSpc>
                 <a:spcPct val="100000"/>
               </a:lnSpc>
@@ -6327,7 +6386,7 @@
             </a:endParaRPr>
           </a:p>
           <a:p>
-            <a:pPr lvl="1" marL="864000" indent="-323280" algn="r" rtl="1">
+            <a:pPr lvl="1" marL="864000" indent="-322920" algn="r" rtl="1">
               <a:lnSpc>
                 <a:spcPct val="100000"/>
               </a:lnSpc>
@@ -6356,7 +6415,7 @@
             </a:endParaRPr>
           </a:p>
           <a:p>
-            <a:pPr marL="432000" indent="-323280" algn="r" rtl="1">
+            <a:pPr marL="432000" indent="-322920" algn="r" rtl="1">
               <a:lnSpc>
                 <a:spcPct val="100000"/>
               </a:lnSpc>
@@ -6385,7 +6444,7 @@
             </a:endParaRPr>
           </a:p>
           <a:p>
-            <a:pPr marL="432000" indent="-323280" algn="r" rtl="1">
+            <a:pPr marL="432000" indent="-322920" algn="r" rtl="1">
               <a:lnSpc>
                 <a:spcPct val="100000"/>
               </a:lnSpc>
@@ -6414,7 +6473,7 @@
             </a:endParaRPr>
           </a:p>
           <a:p>
-            <a:pPr marL="432000" indent="-323280" algn="r" rtl="1">
+            <a:pPr marL="432000" indent="-322920" algn="r" rtl="1">
               <a:lnSpc>
                 <a:spcPct val="100000"/>
               </a:lnSpc>

</xml_diff>